<commit_message>
Lots of edits (and excluded solutions).
</commit_message>
<xml_diff>
--- a/course-website/course-files/slides/L01a_IntrototheCourse.pptx
+++ b/course-website/course-files/slides/L01a_IntrototheCourse.pptx
@@ -268,6 +268,11 @@
       </a:defRPr>
     </a:lvl9pPr>
   </p:defaultTextStyle>
+  <p:extLst>
+    <p:ext uri="{EFAFB233-063F-42B5-8137-9DF3F51BA10A}">
+      <p15:sldGuideLst xmlns:p15="http://schemas.microsoft.com/office/powerpoint/2012/main"/>
+    </p:ext>
+  </p:extLst>
 </p:presentation>
 </file>
 
@@ -1053,7 +1058,7 @@
         </p:nvSpPr>
         <p:spPr>
           <a:xfrm>
-            <a:off x="381300" y="685800"/>
+            <a:off x="381000" y="685800"/>
             <a:ext cx="6096000" cy="3429000"/>
           </a:xfrm>
           <a:custGeom>
@@ -1573,7 +1578,7 @@
         </p:nvSpPr>
         <p:spPr>
           <a:xfrm>
-            <a:off x="381300" y="685800"/>
+            <a:off x="381000" y="685800"/>
             <a:ext cx="6096000" cy="3429000"/>
           </a:xfrm>
           <a:custGeom>
@@ -1677,7 +1682,7 @@
         </p:nvSpPr>
         <p:spPr>
           <a:xfrm>
-            <a:off x="381300" y="685800"/>
+            <a:off x="381000" y="685800"/>
             <a:ext cx="6096000" cy="3429000"/>
           </a:xfrm>
           <a:custGeom>
@@ -1781,7 +1786,7 @@
         </p:nvSpPr>
         <p:spPr>
           <a:xfrm>
-            <a:off x="381300" y="685800"/>
+            <a:off x="381000" y="685800"/>
             <a:ext cx="6096000" cy="3429000"/>
           </a:xfrm>
           <a:custGeom>
@@ -8623,10 +8628,10 @@
               <a:buNone/>
             </a:pPr>
             <a:r>
-              <a:rPr lang="en"/>
-              <a:t>Coding is hard, and it takes a long time to feel comfortable and confident doing it. Sarah and Nova are here to help with any and all questions and concerns that you have. That said, we can’t do it without you doing your part! This includes:</a:t>
+              <a:rPr lang="en" dirty="0"/>
+              <a:t>Coding is hard, and it takes a long time to feel comfortable and confident doing it. We are here to help with any and all questions and concerns that you have. That said, we can’t do it without you doing your part! This includes:</a:t>
             </a:r>
-            <a:endParaRPr/>
+            <a:endParaRPr dirty="0"/>
           </a:p>
           <a:p>
             <a:pPr marL="457200" lvl="0" indent="-336550" algn="l" rtl="0">
@@ -8640,10 +8645,10 @@
               <a:buAutoNum type="arabicPeriod"/>
             </a:pPr>
             <a:r>
-              <a:rPr lang="en" sz="1700"/>
+              <a:rPr lang="en" sz="1700" dirty="0"/>
               <a:t>Doing the assigned readings</a:t>
             </a:r>
-            <a:endParaRPr sz="1700"/>
+            <a:endParaRPr sz="1700" dirty="0"/>
           </a:p>
           <a:p>
             <a:pPr marL="457200" lvl="0" indent="-336550" algn="l" rtl="0">
@@ -8657,10 +8662,10 @@
               <a:buAutoNum type="arabicPeriod"/>
             </a:pPr>
             <a:r>
-              <a:rPr lang="en" sz="1700"/>
+              <a:rPr lang="en" sz="1700" dirty="0"/>
               <a:t>Asking questions during lecture / tutorials if something isn’t making sense. I promise that if you’re confused, you are not alone.</a:t>
             </a:r>
-            <a:endParaRPr sz="1700"/>
+            <a:endParaRPr sz="1700" dirty="0"/>
           </a:p>
           <a:p>
             <a:pPr marL="457200" lvl="0" indent="-336550" algn="l" rtl="0">
@@ -8674,10 +8679,10 @@
               <a:buAutoNum type="arabicPeriod"/>
             </a:pPr>
             <a:r>
-              <a:rPr lang="en" sz="1700"/>
+              <a:rPr lang="en" sz="1700" dirty="0"/>
               <a:t>Please come to office hours if you don’t understand something.</a:t>
             </a:r>
-            <a:endParaRPr sz="1700"/>
+            <a:endParaRPr sz="1700" dirty="0"/>
           </a:p>
           <a:p>
             <a:pPr marL="457200" lvl="0" indent="-336550" algn="l" rtl="0">
@@ -8691,10 +8696,10 @@
               <a:buAutoNum type="arabicPeriod"/>
             </a:pPr>
             <a:r>
-              <a:rPr lang="en" sz="1700"/>
-              <a:t>Use your resources to help you learn, including: Google, the browser inspector, your classmates and friends, Nova, and Sarah</a:t>
+              <a:rPr lang="en" sz="1700" dirty="0"/>
+              <a:t>Use your resources to help you learn, including: Google, the browser inspector, your classmates and friends, and Prof. Van Wart.</a:t>
             </a:r>
-            <a:endParaRPr sz="1700"/>
+            <a:endParaRPr sz="1700" dirty="0"/>
           </a:p>
         </p:txBody>
       </p:sp>
@@ -10896,10 +10901,10 @@
               <a:buChar char="●"/>
             </a:pPr>
             <a:r>
-              <a:rPr lang="en" sz="1800"/>
+              <a:rPr lang="en" sz="1800" dirty="0"/>
               <a:t>We will be coding during regularly scheduled lecture time.</a:t>
             </a:r>
-            <a:endParaRPr sz="1800"/>
+            <a:endParaRPr sz="1800" dirty="0"/>
           </a:p>
           <a:p>
             <a:pPr marL="457200" lvl="0" indent="-330200" algn="l" rtl="0">
@@ -10916,11 +10921,11 @@
               <a:buChar char="●"/>
             </a:pPr>
             <a:r>
-              <a:rPr lang="en" sz="1800"/>
+              <a:rPr lang="en" sz="1800" dirty="0"/>
               <a:t>We will be using </a:t>
             </a:r>
             <a:r>
-              <a:rPr lang="en" sz="1800" u="sng">
+              <a:rPr lang="en" sz="1800" u="sng" dirty="0">
                 <a:solidFill>
                   <a:schemeClr val="hlink"/>
                 </a:solidFill>
@@ -10929,10 +10934,10 @@
               <a:t>Visual Studio Code</a:t>
             </a:r>
             <a:r>
-              <a:rPr lang="en" sz="1800"/>
+              <a:rPr lang="en" sz="1800" dirty="0"/>
               <a:t> as our code editor.</a:t>
             </a:r>
-            <a:endParaRPr sz="1800"/>
+            <a:endParaRPr sz="1800" dirty="0"/>
           </a:p>
           <a:p>
             <a:pPr marL="457200" lvl="0" indent="-330200" algn="l" rtl="0">
@@ -10949,11 +10954,11 @@
               <a:buChar char="●"/>
             </a:pPr>
             <a:r>
-              <a:rPr lang="en" sz="1800"/>
+              <a:rPr lang="en" sz="1800" dirty="0"/>
               <a:t>We will be hosting our websites using GitHub pages (and will therefore be learning how to use git and </a:t>
             </a:r>
             <a:r>
-              <a:rPr lang="en" sz="1800" u="sng">
+              <a:rPr lang="en" sz="1800" u="sng" dirty="0">
                 <a:solidFill>
                   <a:schemeClr val="hlink"/>
                 </a:solidFill>
@@ -10962,10 +10967,29 @@
               <a:t>GitHub</a:t>
             </a:r>
             <a:r>
-              <a:rPr lang="en" sz="1800"/>
+              <a:rPr lang="en" sz="1800" dirty="0"/>
               <a:t>)</a:t>
             </a:r>
-            <a:endParaRPr sz="1800"/>
+          </a:p>
+          <a:p>
+            <a:pPr lvl="1" indent="-330200">
+              <a:spcBef>
+                <a:spcPts val="1000"/>
+              </a:spcBef>
+              <a:spcAft>
+                <a:spcPts val="1000"/>
+              </a:spcAft>
+              <a:buClr>
+                <a:srgbClr val="3D85C6"/>
+              </a:buClr>
+              <a:buSzPts val="1600"/>
+              <a:buChar char="●"/>
+            </a:pPr>
+            <a:r>
+              <a:rPr lang="en" sz="1400" dirty="0"/>
+              <a:t>Note: Mr. Kitchen will be turning in files by zipping them.</a:t>
+            </a:r>
+            <a:endParaRPr sz="1400" dirty="0"/>
           </a:p>
         </p:txBody>
       </p:sp>
@@ -11165,6 +11189,67 @@
                       </p:childTnLst>
                     </p:cTn>
                   </p:par>
+                  <p:par>
+                    <p:cTn id="18" fill="hold">
+                      <p:stCondLst>
+                        <p:cond delay="indefinite"/>
+                      </p:stCondLst>
+                      <p:childTnLst>
+                        <p:par>
+                          <p:cTn id="19" fill="hold">
+                            <p:stCondLst>
+                              <p:cond delay="0"/>
+                            </p:stCondLst>
+                            <p:childTnLst>
+                              <p:par>
+                                <p:cTn id="20" presetID="10" presetClass="entr" presetSubtype="0" fill="hold" nodeType="clickEffect">
+                                  <p:stCondLst>
+                                    <p:cond delay="0"/>
+                                  </p:stCondLst>
+                                  <p:childTnLst>
+                                    <p:set>
+                                      <p:cBhvr>
+                                        <p:cTn id="21" dur="1" fill="hold">
+                                          <p:stCondLst>
+                                            <p:cond delay="0"/>
+                                          </p:stCondLst>
+                                        </p:cTn>
+                                        <p:tgtEl>
+                                          <p:spTgt spid="164">
+                                            <p:txEl>
+                                              <p:pRg st="3" end="3"/>
+                                            </p:txEl>
+                                          </p:spTgt>
+                                        </p:tgtEl>
+                                        <p:attrNameLst>
+                                          <p:attrName>style.visibility</p:attrName>
+                                        </p:attrNameLst>
+                                      </p:cBhvr>
+                                      <p:to>
+                                        <p:strVal val="visible"/>
+                                      </p:to>
+                                    </p:set>
+                                    <p:animEffect transition="in" filter="fade">
+                                      <p:cBhvr>
+                                        <p:cTn id="22" dur="1"/>
+                                        <p:tgtEl>
+                                          <p:spTgt spid="164">
+                                            <p:txEl>
+                                              <p:pRg st="3" end="3"/>
+                                            </p:txEl>
+                                          </p:spTgt>
+                                        </p:tgtEl>
+                                      </p:cBhvr>
+                                    </p:animEffect>
+                                  </p:childTnLst>
+                                </p:cTn>
+                              </p:par>
+                            </p:childTnLst>
+                          </p:cTn>
+                        </p:par>
+                      </p:childTnLst>
+                    </p:cTn>
+                  </p:par>
                 </p:childTnLst>
               </p:cTn>
               <p:prevCondLst>
@@ -11288,19 +11373,12 @@
               <a:buChar char="●"/>
             </a:pPr>
             <a:r>
-              <a:rPr lang="en" sz="1800"/>
+              <a:rPr lang="en" sz="1800" dirty="0"/>
               <a:t>We will meet together every Monday, Wednesday, and Friday in person. </a:t>
             </a:r>
-            <a:endParaRPr sz="1800"/>
-          </a:p>
-          <a:p>
-            <a:pPr marL="457200" lvl="0" indent="-342900" algn="l" rtl="0">
-              <a:spcBef>
-                <a:spcPts val="1000"/>
-              </a:spcBef>
-              <a:spcAft>
-                <a:spcPts val="0"/>
-              </a:spcAft>
+          </a:p>
+          <a:p>
+            <a:pPr lvl="1" indent="-342900">
               <a:buClr>
                 <a:schemeClr val="accent1"/>
               </a:buClr>
@@ -11308,10 +11386,10 @@
               <a:buChar char="●"/>
             </a:pPr>
             <a:r>
-              <a:rPr lang="en" sz="1800"/>
-              <a:t>We will use class time to collectively understand and discuss the readings and concepts we are learning about, and to practice various programming and design techniques.</a:t>
+              <a:rPr lang="en" sz="1400" dirty="0"/>
+              <a:t>For Mr. Kitchen, I will come out during the first few Thursdays, and then less frequently (ideally every other Thursday, but it depends). </a:t>
             </a:r>
-            <a:endParaRPr sz="1800"/>
+            <a:endParaRPr sz="1400" dirty="0"/>
           </a:p>
           <a:p>
             <a:pPr marL="457200" lvl="0" indent="-342900" algn="l" rtl="0">
@@ -11319,7 +11397,7 @@
                 <a:spcPts val="1000"/>
               </a:spcBef>
               <a:spcAft>
-                <a:spcPts val="1000"/>
+                <a:spcPts val="0"/>
               </a:spcAft>
               <a:buClr>
                 <a:schemeClr val="accent1"/>
@@ -11328,10 +11406,30 @@
               <a:buChar char="●"/>
             </a:pPr>
             <a:r>
-              <a:rPr lang="en" sz="1800"/>
+              <a:rPr lang="en" sz="1800" dirty="0"/>
+              <a:t>We will use class time to collectively understand and discuss the readings and concepts we are learning about, and to practice various programming and design techniques.</a:t>
+            </a:r>
+            <a:endParaRPr sz="1800" dirty="0"/>
+          </a:p>
+          <a:p>
+            <a:pPr marL="457200" lvl="0" indent="-342900" algn="l" rtl="0">
+              <a:spcBef>
+                <a:spcPts val="1000"/>
+              </a:spcBef>
+              <a:spcAft>
+                <a:spcPts val="1000"/>
+              </a:spcAft>
+              <a:buClr>
+                <a:schemeClr val="accent1"/>
+              </a:buClr>
+              <a:buSzPts val="1800"/>
+              <a:buChar char="●"/>
+            </a:pPr>
+            <a:r>
+              <a:rPr lang="en" sz="1800" dirty="0"/>
               <a:t>Your timely and engaged attendance at every class is thus very important – both for you and for your classmates.</a:t>
             </a:r>
-            <a:endParaRPr sz="1800"/>
+            <a:endParaRPr sz="1800" dirty="0"/>
           </a:p>
         </p:txBody>
       </p:sp>
@@ -11531,6 +11629,67 @@
                       </p:childTnLst>
                     </p:cTn>
                   </p:par>
+                  <p:par>
+                    <p:cTn id="18" fill="hold">
+                      <p:stCondLst>
+                        <p:cond delay="indefinite"/>
+                      </p:stCondLst>
+                      <p:childTnLst>
+                        <p:par>
+                          <p:cTn id="19" fill="hold">
+                            <p:stCondLst>
+                              <p:cond delay="0"/>
+                            </p:stCondLst>
+                            <p:childTnLst>
+                              <p:par>
+                                <p:cTn id="20" presetID="10" presetClass="entr" presetSubtype="0" fill="hold" nodeType="clickEffect">
+                                  <p:stCondLst>
+                                    <p:cond delay="0"/>
+                                  </p:stCondLst>
+                                  <p:childTnLst>
+                                    <p:set>
+                                      <p:cBhvr>
+                                        <p:cTn id="21" dur="1" fill="hold">
+                                          <p:stCondLst>
+                                            <p:cond delay="0"/>
+                                          </p:stCondLst>
+                                        </p:cTn>
+                                        <p:tgtEl>
+                                          <p:spTgt spid="170">
+                                            <p:txEl>
+                                              <p:pRg st="3" end="3"/>
+                                            </p:txEl>
+                                          </p:spTgt>
+                                        </p:tgtEl>
+                                        <p:attrNameLst>
+                                          <p:attrName>style.visibility</p:attrName>
+                                        </p:attrNameLst>
+                                      </p:cBhvr>
+                                      <p:to>
+                                        <p:strVal val="visible"/>
+                                      </p:to>
+                                    </p:set>
+                                    <p:animEffect transition="in" filter="fade">
+                                      <p:cBhvr>
+                                        <p:cTn id="22" dur="1"/>
+                                        <p:tgtEl>
+                                          <p:spTgt spid="170">
+                                            <p:txEl>
+                                              <p:pRg st="3" end="3"/>
+                                            </p:txEl>
+                                          </p:spTgt>
+                                        </p:tgtEl>
+                                      </p:cBhvr>
+                                    </p:animEffect>
+                                  </p:childTnLst>
+                                </p:cTn>
+                              </p:par>
+                            </p:childTnLst>
+                          </p:cTn>
+                        </p:par>
+                      </p:childTnLst>
+                    </p:cTn>
+                  </p:par>
                 </p:childTnLst>
               </p:cTn>
               <p:prevCondLst>
@@ -11608,10 +11767,10 @@
               <a:buNone/>
             </a:pPr>
             <a:r>
-              <a:rPr lang="en"/>
+              <a:rPr lang="en" dirty="0"/>
               <a:t>Attendance &amp; Participation: Grading</a:t>
             </a:r>
-            <a:endParaRPr/>
+            <a:endParaRPr dirty="0"/>
           </a:p>
         </p:txBody>
       </p:sp>
@@ -11650,10 +11809,10 @@
               <a:buNone/>
             </a:pPr>
             <a:r>
-              <a:rPr lang="en"/>
+              <a:rPr lang="en" dirty="0"/>
               <a:t>You are allowed three unexcused absences during the semester, no questions asked. You should reserve these absences for the occasional emergency or illness. After three absences, your participation grade will be impacted.</a:t>
             </a:r>
-            <a:endParaRPr/>
+            <a:endParaRPr dirty="0"/>
           </a:p>
         </p:txBody>
       </p:sp>
@@ -14690,10 +14849,10 @@
               <a:buAutoNum type="arabicPeriod"/>
             </a:pPr>
             <a:r>
-              <a:rPr lang="en"/>
+              <a:rPr lang="en" dirty="0"/>
               <a:t>I’m Prof. Sarah Van Wart (she / her)</a:t>
             </a:r>
-            <a:endParaRPr/>
+            <a:endParaRPr dirty="0"/>
           </a:p>
           <a:p>
             <a:pPr marL="457200" lvl="0" indent="-342900" algn="l" rtl="0">
@@ -14707,10 +14866,10 @@
               <a:buAutoNum type="arabicPeriod"/>
             </a:pPr>
             <a:r>
-              <a:rPr lang="en"/>
-              <a:t>I majored in Economics (not a CS Major)</a:t>
+              <a:rPr lang="en" dirty="0"/>
+              <a:t>I majored in Economics (not a CS Major). </a:t>
             </a:r>
-            <a:endParaRPr/>
+            <a:endParaRPr dirty="0"/>
           </a:p>
           <a:p>
             <a:pPr marL="457200" lvl="0" indent="-342900" algn="l" rtl="0">
@@ -14724,10 +14883,10 @@
               <a:buAutoNum type="arabicPeriod"/>
             </a:pPr>
             <a:r>
-              <a:rPr lang="en"/>
+              <a:rPr lang="en" dirty="0"/>
               <a:t>I learned about web programming after undergrad – took a few community college classes, but mostly learned on the job</a:t>
             </a:r>
-            <a:endParaRPr/>
+            <a:endParaRPr dirty="0"/>
           </a:p>
           <a:p>
             <a:pPr marL="457200" lvl="0" indent="-342900" algn="l" rtl="0">
@@ -14741,10 +14900,10 @@
               <a:buAutoNum type="arabicPeriod"/>
             </a:pPr>
             <a:r>
-              <a:rPr lang="en"/>
+              <a:rPr lang="en" dirty="0"/>
               <a:t>Have done web design and web programming for almost 20 years and have seen many generations of web technologies and their evolution</a:t>
             </a:r>
-            <a:endParaRPr/>
+            <a:endParaRPr dirty="0"/>
           </a:p>
           <a:p>
             <a:pPr marL="457200" lvl="0" indent="-342900" algn="l" rtl="0">
@@ -14758,18 +14917,18 @@
               <a:buAutoNum type="arabicPeriod"/>
             </a:pPr>
             <a:r>
-              <a:rPr lang="en"/>
+              <a:rPr lang="en" dirty="0"/>
               <a:t>Received my PhD at the School of Information at UC Berkeley. My research focuses on l</a:t>
             </a:r>
             <a:r>
-              <a:rPr lang="en" sz="1800"/>
+              <a:rPr lang="en" sz="1800" dirty="0"/>
               <a:t>earning and education; and c</a:t>
             </a:r>
             <a:r>
-              <a:rPr lang="en"/>
+              <a:rPr lang="en" dirty="0"/>
               <a:t>ivic tech and civic engagement</a:t>
             </a:r>
-            <a:endParaRPr/>
+            <a:endParaRPr dirty="0"/>
           </a:p>
         </p:txBody>
       </p:sp>

</xml_diff>